<commit_message>
Initial v05 analysis done
</commit_message>
<xml_diff>
--- a/rampPosterSFN2018.pptx
+++ b/rampPosterSFN2018.pptx
@@ -3724,8 +3724,8 @@
         </p:blipFill>
         <p:spPr>
           <a:xfrm>
-            <a:off x="38144032" y="7234210"/>
-            <a:ext cx="3638904" cy="2626790"/>
+            <a:off x="38715044" y="6795813"/>
+            <a:ext cx="3121666" cy="2253415"/>
           </a:xfrm>
           <a:prstGeom prst="rect">
             <a:avLst/>
@@ -3754,8 +3754,8 @@
         </p:blipFill>
         <p:spPr>
           <a:xfrm>
-            <a:off x="38111706" y="4424369"/>
-            <a:ext cx="3703557" cy="2673461"/>
+            <a:off x="38621410" y="4418815"/>
+            <a:ext cx="3177129" cy="2293452"/>
           </a:xfrm>
           <a:prstGeom prst="rect">
             <a:avLst/>
@@ -4543,7 +4543,7 @@
         </p:nvSpPr>
         <p:spPr>
           <a:xfrm>
-            <a:off x="21774544" y="22893412"/>
+            <a:off x="21516070" y="20551673"/>
             <a:ext cx="19793546" cy="1079641"/>
           </a:xfrm>
           <a:prstGeom prst="rect">
@@ -4582,8 +4582,8 @@
         </p:nvSpPr>
         <p:spPr>
           <a:xfrm>
-            <a:off x="22065443" y="26272610"/>
-            <a:ext cx="19646663" cy="2618524"/>
+            <a:off x="22073417" y="26253836"/>
+            <a:ext cx="19646663" cy="2895523"/>
           </a:xfrm>
           <a:prstGeom prst="rect">
             <a:avLst/>
@@ -4604,7 +4604,7 @@
                 <a:solidFill>
                   <a:srgbClr val="000000"/>
                 </a:solidFill>
-                <a:latin typeface="Avenir Roman" panose="02000503020000020003"/>
+                <a:latin typeface="+mj-lt"/>
                 <a:cs typeface="Avenir Heavy"/>
               </a:rPr>
               <a:t>References:</a:t>
@@ -4616,31 +4616,31 @@
             </a:pPr>
             <a:r>
               <a:rPr lang="en-US" sz="1800" dirty="0">
-                <a:latin typeface="Avenir Roman" panose="02000503020000020003"/>
+                <a:latin typeface="+mj-lt"/>
               </a:rPr>
               <a:t>Schultz, W. (2001). Book review: Reward signaling by dopamine neurons. </a:t>
             </a:r>
             <a:r>
               <a:rPr lang="en-US" sz="1800" i="1" dirty="0">
-                <a:latin typeface="Avenir Roman" panose="02000503020000020003"/>
+                <a:latin typeface="+mj-lt"/>
               </a:rPr>
               <a:t>The Neuroscientist</a:t>
             </a:r>
             <a:r>
               <a:rPr lang="en-US" sz="1800" dirty="0">
-                <a:latin typeface="Avenir Roman" panose="02000503020000020003"/>
+                <a:latin typeface="+mj-lt"/>
               </a:rPr>
               <a:t>, </a:t>
             </a:r>
             <a:r>
               <a:rPr lang="en-US" sz="1800" i="1" dirty="0">
-                <a:latin typeface="Avenir Roman" panose="02000503020000020003"/>
+                <a:latin typeface="+mj-lt"/>
               </a:rPr>
               <a:t>7</a:t>
             </a:r>
             <a:r>
               <a:rPr lang="en-US" sz="1800" dirty="0">
-                <a:latin typeface="Avenir Roman" panose="02000503020000020003"/>
+                <a:latin typeface="+mj-lt"/>
               </a:rPr>
               <a:t>(4), 293-302</a:t>
             </a:r>
@@ -4651,49 +4651,49 @@
             </a:pPr>
             <a:r>
               <a:rPr lang="en-US" sz="1800" dirty="0" err="1">
-                <a:latin typeface="Avenir Roman" panose="02000503020000020003"/>
+                <a:latin typeface="+mj-lt"/>
               </a:rPr>
               <a:t>Niv</a:t>
             </a:r>
             <a:r>
               <a:rPr lang="en-US" sz="1800" dirty="0">
-                <a:latin typeface="Avenir Roman" panose="02000503020000020003"/>
+                <a:latin typeface="+mj-lt"/>
               </a:rPr>
               <a:t>, Y., </a:t>
             </a:r>
             <a:r>
               <a:rPr lang="en-US" sz="1800" dirty="0" err="1">
-                <a:latin typeface="Avenir Roman" panose="02000503020000020003"/>
+                <a:latin typeface="+mj-lt"/>
               </a:rPr>
               <a:t>Daw</a:t>
             </a:r>
             <a:r>
               <a:rPr lang="en-US" sz="1800" dirty="0">
-                <a:latin typeface="Avenir Roman" panose="02000503020000020003"/>
+                <a:latin typeface="+mj-lt"/>
               </a:rPr>
               <a:t>, N. D., Joel, D., &amp; Dayan, P. (2007). Tonic dopamine: opportunity costs and the control of response vigor. </a:t>
             </a:r>
             <a:r>
               <a:rPr lang="en-US" sz="1800" i="1" dirty="0">
-                <a:latin typeface="Avenir Roman" panose="02000503020000020003"/>
+                <a:latin typeface="+mj-lt"/>
               </a:rPr>
               <a:t>Psychopharmacology</a:t>
             </a:r>
             <a:r>
               <a:rPr lang="en-US" sz="1800" dirty="0">
-                <a:latin typeface="Avenir Roman" panose="02000503020000020003"/>
+                <a:latin typeface="+mj-lt"/>
               </a:rPr>
               <a:t>, </a:t>
             </a:r>
             <a:r>
               <a:rPr lang="en-US" sz="1800" i="1" dirty="0">
-                <a:latin typeface="Avenir Roman" panose="02000503020000020003"/>
+                <a:latin typeface="+mj-lt"/>
               </a:rPr>
               <a:t>191</a:t>
             </a:r>
             <a:r>
               <a:rPr lang="en-US" sz="1800" dirty="0">
-                <a:latin typeface="Avenir Roman" panose="02000503020000020003"/>
+                <a:latin typeface="+mj-lt"/>
               </a:rPr>
               <a:t>(3), 507-520.</a:t>
             </a:r>
@@ -4705,55 +4705,55 @@
             </a:pPr>
             <a:r>
               <a:rPr lang="en-US" sz="1800" dirty="0">
-                <a:latin typeface="Avenir Roman" panose="02000503020000020003"/>
+                <a:latin typeface="+mj-lt"/>
               </a:rPr>
               <a:t>Hamid, A. A., Pettibone, J. R., Mabrouk, O. S., Hetrick, V. L., Schmidt, R., Vander </a:t>
             </a:r>
             <a:r>
               <a:rPr lang="en-US" sz="1800" dirty="0" err="1">
-                <a:latin typeface="Avenir Roman" panose="02000503020000020003"/>
+                <a:latin typeface="+mj-lt"/>
               </a:rPr>
               <a:t>Weele</a:t>
             </a:r>
             <a:r>
               <a:rPr lang="en-US" sz="1800" dirty="0">
-                <a:latin typeface="Avenir Roman" panose="02000503020000020003"/>
+                <a:latin typeface="+mj-lt"/>
               </a:rPr>
               <a:t>, C. M., ... &amp; </a:t>
             </a:r>
             <a:r>
               <a:rPr lang="en-US" sz="1800" dirty="0" err="1">
-                <a:latin typeface="Avenir Roman" panose="02000503020000020003"/>
+                <a:latin typeface="+mj-lt"/>
               </a:rPr>
               <a:t>Berke</a:t>
             </a:r>
             <a:r>
               <a:rPr lang="en-US" sz="1800" dirty="0">
-                <a:latin typeface="Avenir Roman" panose="02000503020000020003"/>
+                <a:latin typeface="+mj-lt"/>
               </a:rPr>
               <a:t>, J. D. (2016). Mesolimbic dopamine signals the value of work. </a:t>
             </a:r>
             <a:r>
               <a:rPr lang="en-US" sz="1800" i="1" dirty="0">
-                <a:latin typeface="Avenir Roman" panose="02000503020000020003"/>
+                <a:latin typeface="+mj-lt"/>
               </a:rPr>
               <a:t>Nature neuroscience</a:t>
             </a:r>
             <a:r>
               <a:rPr lang="en-US" sz="1800" dirty="0">
-                <a:latin typeface="Avenir Roman" panose="02000503020000020003"/>
+                <a:latin typeface="+mj-lt"/>
               </a:rPr>
               <a:t>, </a:t>
             </a:r>
             <a:r>
               <a:rPr lang="en-US" sz="1800" i="1" dirty="0">
-                <a:latin typeface="Avenir Roman" panose="02000503020000020003"/>
+                <a:latin typeface="+mj-lt"/>
               </a:rPr>
               <a:t>19</a:t>
             </a:r>
             <a:r>
               <a:rPr lang="en-US" sz="1800" dirty="0">
-                <a:latin typeface="Avenir Roman" panose="02000503020000020003"/>
+                <a:latin typeface="+mj-lt"/>
               </a:rPr>
               <a:t>(1), 117.</a:t>
             </a:r>
@@ -4765,43 +4765,43 @@
             </a:pPr>
             <a:r>
               <a:rPr lang="en-US" sz="1800" dirty="0">
-                <a:latin typeface="Avenir Roman" panose="02000503020000020003"/>
+                <a:latin typeface="+mj-lt"/>
               </a:rPr>
               <a:t>Collins, A. G., &amp; Frank, M. J. (2014). Opponent actor learning (</a:t>
             </a:r>
             <a:r>
               <a:rPr lang="en-US" sz="1800" dirty="0" err="1">
-                <a:latin typeface="Avenir Roman" panose="02000503020000020003"/>
+                <a:latin typeface="+mj-lt"/>
               </a:rPr>
               <a:t>OpAL</a:t>
             </a:r>
             <a:r>
               <a:rPr lang="en-US" sz="1800" dirty="0">
-                <a:latin typeface="Avenir Roman" panose="02000503020000020003"/>
+                <a:latin typeface="+mj-lt"/>
               </a:rPr>
               <a:t>): Modeling interactive effects of striatal dopamine on reinforcement learning and choice incentive. </a:t>
             </a:r>
             <a:r>
               <a:rPr lang="en-US" sz="1800" i="1" dirty="0">
-                <a:latin typeface="Avenir Roman" panose="02000503020000020003"/>
+                <a:latin typeface="+mj-lt"/>
               </a:rPr>
               <a:t>Psychological review</a:t>
             </a:r>
             <a:r>
               <a:rPr lang="en-US" sz="1800" dirty="0">
-                <a:latin typeface="Avenir Roman" panose="02000503020000020003"/>
+                <a:latin typeface="+mj-lt"/>
               </a:rPr>
               <a:t>, </a:t>
             </a:r>
             <a:r>
               <a:rPr lang="en-US" sz="1800" i="1" dirty="0">
-                <a:latin typeface="Avenir Roman" panose="02000503020000020003"/>
+                <a:latin typeface="+mj-lt"/>
               </a:rPr>
               <a:t>121</a:t>
             </a:r>
             <a:r>
               <a:rPr lang="en-US" sz="1800" dirty="0">
-                <a:latin typeface="Avenir Roman" panose="02000503020000020003"/>
+                <a:latin typeface="+mj-lt"/>
               </a:rPr>
               <a:t>(3), 337.</a:t>
             </a:r>
@@ -4812,57 +4812,98 @@
             </a:pPr>
             <a:r>
               <a:rPr lang="en-US" sz="1800" dirty="0">
-                <a:latin typeface="Avenir Roman" panose="02000503020000020003"/>
+                <a:latin typeface="+mj-lt"/>
               </a:rPr>
               <a:t>Howe, M. W., Tierney, P. L., Sandberg, S. G., Phillips, P. E., &amp; </a:t>
             </a:r>
             <a:r>
               <a:rPr lang="en-US" sz="1800" dirty="0" err="1">
-                <a:latin typeface="Avenir Roman" panose="02000503020000020003"/>
+                <a:latin typeface="+mj-lt"/>
               </a:rPr>
               <a:t>Graybiel</a:t>
             </a:r>
             <a:r>
               <a:rPr lang="en-US" sz="1800" dirty="0">
-                <a:latin typeface="Avenir Roman" panose="02000503020000020003"/>
+                <a:latin typeface="+mj-lt"/>
               </a:rPr>
               <a:t>, A. M. (2013). Prolonged dopamine </a:t>
             </a:r>
             <a:r>
               <a:rPr lang="en-US" sz="1800" dirty="0" err="1">
-                <a:latin typeface="Avenir Roman" panose="02000503020000020003"/>
+                <a:latin typeface="+mj-lt"/>
               </a:rPr>
               <a:t>signalling</a:t>
             </a:r>
             <a:r>
               <a:rPr lang="en-US" sz="1800" dirty="0">
-                <a:latin typeface="Avenir Roman" panose="02000503020000020003"/>
+                <a:latin typeface="+mj-lt"/>
               </a:rPr>
               <a:t> in striatum signals proximity and value of distant rewards. </a:t>
             </a:r>
             <a:r>
               <a:rPr lang="en-US" sz="1800" i="1" dirty="0">
-                <a:latin typeface="Avenir Roman" panose="02000503020000020003"/>
+                <a:latin typeface="+mj-lt"/>
               </a:rPr>
               <a:t>Nature</a:t>
             </a:r>
             <a:r>
               <a:rPr lang="en-US" sz="1800" dirty="0">
-                <a:latin typeface="Avenir Roman" panose="02000503020000020003"/>
+                <a:latin typeface="+mj-lt"/>
               </a:rPr>
               <a:t>, </a:t>
             </a:r>
             <a:r>
               <a:rPr lang="en-US" sz="1800" i="1" dirty="0">
-                <a:latin typeface="Avenir Roman" panose="02000503020000020003"/>
+                <a:latin typeface="+mj-lt"/>
               </a:rPr>
               <a:t>500</a:t>
             </a:r>
             <a:r>
               <a:rPr lang="en-US" sz="1800" dirty="0">
-                <a:latin typeface="Avenir Roman" panose="02000503020000020003"/>
+                <a:latin typeface="+mj-lt"/>
               </a:rPr>
               <a:t>(7464), 575.</a:t>
+            </a:r>
+          </a:p>
+          <a:p>
+            <a:pPr marL="457200" indent="-457200">
+              <a:buAutoNum type="arabicPeriod"/>
+            </a:pPr>
+            <a:r>
+              <a:rPr lang="en-US" sz="1800" dirty="0" err="1">
+                <a:latin typeface="+mj-lt"/>
+              </a:rPr>
+              <a:t>Buckholtz</a:t>
+            </a:r>
+            <a:r>
+              <a:rPr lang="en-US" sz="1800" dirty="0">
+                <a:latin typeface="+mj-lt"/>
+              </a:rPr>
+              <a:t>, J. W., Treadway, M. T., Cowan, R. L., Woodward, N. D., Li, R., Ansari, M. S., ... &amp; Kessler, R. M. (2010). Dopaminergic network differences in human impulsivity. </a:t>
+            </a:r>
+            <a:r>
+              <a:rPr lang="en-US" sz="1800" i="1" dirty="0">
+                <a:latin typeface="+mj-lt"/>
+              </a:rPr>
+              <a:t>Science</a:t>
+            </a:r>
+            <a:r>
+              <a:rPr lang="en-US" sz="1800" dirty="0">
+                <a:latin typeface="+mj-lt"/>
+              </a:rPr>
+              <a:t>, </a:t>
+            </a:r>
+            <a:r>
+              <a:rPr lang="en-US" sz="1800" i="1" dirty="0">
+                <a:latin typeface="+mj-lt"/>
+              </a:rPr>
+              <a:t>329</a:t>
+            </a:r>
+            <a:r>
+              <a:rPr lang="en-US" sz="1800" dirty="0">
+                <a:latin typeface="+mj-lt"/>
+              </a:rPr>
+              <a:t>(5991), 532-532.</a:t>
             </a:r>
           </a:p>
         </p:txBody>
@@ -5091,8 +5132,8 @@
         </p:nvSpPr>
         <p:spPr>
           <a:xfrm>
-            <a:off x="9875072" y="24238388"/>
-            <a:ext cx="7541407" cy="4185761"/>
+            <a:off x="10199492" y="24291029"/>
+            <a:ext cx="6720935" cy="4185761"/>
           </a:xfrm>
           <a:prstGeom prst="rect">
             <a:avLst/>
@@ -5285,199 +5326,6 @@
       </p:sp>
       <p:sp>
         <p:nvSpPr>
-          <p:cNvPr id="148" name="TextBox 147">
-            <a:extLst>
-              <a:ext uri="{FF2B5EF4-FFF2-40B4-BE49-F238E27FC236}">
-                <a16:creationId xmlns:a16="http://schemas.microsoft.com/office/drawing/2014/main" id="{24103884-D6C1-BD49-88E6-38731321490B}"/>
-              </a:ext>
-            </a:extLst>
-          </p:cNvPr>
-          <p:cNvSpPr txBox="1"/>
-          <p:nvPr/>
-        </p:nvSpPr>
-        <p:spPr>
-          <a:xfrm>
-            <a:off x="24214162" y="4010975"/>
-            <a:ext cx="407484" cy="461665"/>
-          </a:xfrm>
-          <a:prstGeom prst="rect">
-            <a:avLst/>
-          </a:prstGeom>
-          <a:noFill/>
-        </p:spPr>
-        <p:txBody>
-          <a:bodyPr wrap="none" rtlCol="0">
-            <a:spAutoFit/>
-          </a:bodyPr>
-          <a:lstStyle/>
-          <a:p>
-            <a:r>
-              <a:rPr lang="en-US" sz="2400" b="1" dirty="0">
-                <a:latin typeface="Avenir Roman" panose="02000503020000020003" pitchFamily="2" charset="0"/>
-              </a:rPr>
-              <a:t>A</a:t>
-            </a:r>
-          </a:p>
-        </p:txBody>
-      </p:sp>
-      <p:sp>
-        <p:nvSpPr>
-          <p:cNvPr id="149" name="TextBox 148">
-            <a:extLst>
-              <a:ext uri="{FF2B5EF4-FFF2-40B4-BE49-F238E27FC236}">
-                <a16:creationId xmlns:a16="http://schemas.microsoft.com/office/drawing/2014/main" id="{800E4FBB-59AA-FA4F-A72D-74DD6163F17D}"/>
-              </a:ext>
-            </a:extLst>
-          </p:cNvPr>
-          <p:cNvSpPr txBox="1"/>
-          <p:nvPr/>
-        </p:nvSpPr>
-        <p:spPr>
-          <a:xfrm>
-            <a:off x="21861701" y="3570250"/>
-            <a:ext cx="407484" cy="461665"/>
-          </a:xfrm>
-          <a:prstGeom prst="rect">
-            <a:avLst/>
-          </a:prstGeom>
-          <a:noFill/>
-        </p:spPr>
-        <p:txBody>
-          <a:bodyPr wrap="square" rtlCol="0">
-            <a:spAutoFit/>
-          </a:bodyPr>
-          <a:lstStyle/>
-          <a:p>
-            <a:r>
-              <a:rPr lang="en-US" sz="2400" b="1" dirty="0">
-                <a:latin typeface="Avenir Roman" panose="02000503020000020003" pitchFamily="2" charset="0"/>
-              </a:rPr>
-              <a:t>B</a:t>
-            </a:r>
-          </a:p>
-        </p:txBody>
-      </p:sp>
-      <p:sp>
-        <p:nvSpPr>
-          <p:cNvPr id="150" name="TextBox 149">
-            <a:extLst>
-              <a:ext uri="{FF2B5EF4-FFF2-40B4-BE49-F238E27FC236}">
-                <a16:creationId xmlns:a16="http://schemas.microsoft.com/office/drawing/2014/main" id="{BA3E6F8C-E9A0-A24C-B745-5F7B16133CC9}"/>
-              </a:ext>
-            </a:extLst>
-          </p:cNvPr>
-          <p:cNvSpPr txBox="1"/>
-          <p:nvPr/>
-        </p:nvSpPr>
-        <p:spPr>
-          <a:xfrm>
-            <a:off x="20209260" y="3754981"/>
-            <a:ext cx="407484" cy="461665"/>
-          </a:xfrm>
-          <a:prstGeom prst="rect">
-            <a:avLst/>
-          </a:prstGeom>
-          <a:noFill/>
-        </p:spPr>
-        <p:txBody>
-          <a:bodyPr wrap="square" rtlCol="0">
-            <a:spAutoFit/>
-          </a:bodyPr>
-          <a:lstStyle/>
-          <a:p>
-            <a:r>
-              <a:rPr lang="en-US" sz="2400" b="1" dirty="0">
-                <a:latin typeface="Avenir Roman" panose="02000503020000020003" pitchFamily="2" charset="0"/>
-              </a:rPr>
-              <a:t>C</a:t>
-            </a:r>
-          </a:p>
-        </p:txBody>
-      </p:sp>
-      <p:sp>
-        <p:nvSpPr>
-          <p:cNvPr id="159" name="Textfeld 47">
-            <a:extLst>
-              <a:ext uri="{FF2B5EF4-FFF2-40B4-BE49-F238E27FC236}">
-                <a16:creationId xmlns:a16="http://schemas.microsoft.com/office/drawing/2014/main" id="{FB237A7F-6258-434A-8A64-7A6647A79ED4}"/>
-              </a:ext>
-            </a:extLst>
-          </p:cNvPr>
-          <p:cNvSpPr txBox="1"/>
-          <p:nvPr/>
-        </p:nvSpPr>
-        <p:spPr>
-          <a:xfrm>
-            <a:off x="22339512" y="23761020"/>
-            <a:ext cx="19253053" cy="2862322"/>
-          </a:xfrm>
-          <a:prstGeom prst="rect">
-            <a:avLst/>
-          </a:prstGeom>
-          <a:noFill/>
-        </p:spPr>
-        <p:txBody>
-          <a:bodyPr wrap="square" rtlCol="0">
-            <a:spAutoFit/>
-          </a:bodyPr>
-          <a:lstStyle/>
-          <a:p>
-            <a:pPr marL="457200" indent="-457200">
-              <a:buFont typeface="Arial" panose="020B0604020202020204" pitchFamily="34" charset="0"/>
-              <a:buChar char="•"/>
-            </a:pPr>
-            <a:r>
-              <a:rPr lang="en-US" sz="2600" noProof="1">
-                <a:latin typeface="Avenir Roman" panose="02000503020000020003" pitchFamily="2" charset="0"/>
-              </a:rPr>
-              <a:t>The later the gamble interrupted the progress bar (i.e. the closer the participant was to the reward), the more likely a participant gambled and the lower their RT tended to be. </a:t>
-            </a:r>
-          </a:p>
-          <a:p>
-            <a:pPr marL="457200" indent="-457200">
-              <a:buFont typeface="Arial" panose="020B0604020202020204" pitchFamily="34" charset="0"/>
-              <a:buChar char="•"/>
-            </a:pPr>
-            <a:r>
-              <a:rPr lang="en-US" sz="2600" noProof="1">
-                <a:latin typeface="Avenir Roman" panose="02000503020000020003" pitchFamily="2" charset="0"/>
-              </a:rPr>
-              <a:t>The more pronounced a participant’s gamble ramp was, the more negative their RT ramp tended to be.</a:t>
-            </a:r>
-          </a:p>
-          <a:p>
-            <a:pPr marL="457200" indent="-457200">
-              <a:buFont typeface="Arial" panose="020B0604020202020204" pitchFamily="34" charset="0"/>
-              <a:buChar char="•"/>
-            </a:pPr>
-            <a:r>
-              <a:rPr lang="en-US" sz="2600" noProof="1">
-                <a:latin typeface="Avenir Roman" panose="02000503020000020003" pitchFamily="2" charset="0"/>
-              </a:rPr>
-              <a:t>Magnitude had no effect on driving the propensity  to gamble but a higher value gamble increased a participant’s propensity to gamble.</a:t>
-            </a:r>
-          </a:p>
-          <a:p>
-            <a:pPr marL="457200" indent="-457200">
-              <a:buFont typeface="Arial" panose="020B0604020202020204" pitchFamily="34" charset="0"/>
-              <a:buChar char="•"/>
-            </a:pPr>
-            <a:r>
-              <a:rPr lang="en-US" sz="2600" noProof="1">
-                <a:latin typeface="Avenir Roman" panose="02000503020000020003" pitchFamily="2" charset="0"/>
-              </a:rPr>
-              <a:t>These pilot data are consistent with the theory that DA dynamics affect how humans calculate the value of an acion and that the value of such a calculation may shift as a promixity to a reward.</a:t>
-            </a:r>
-          </a:p>
-          <a:p>
-            <a:endParaRPr lang="en-US" sz="2400" noProof="1">
-              <a:latin typeface="Avenir Roman" panose="02000503020000020003" pitchFamily="2" charset="0"/>
-            </a:endParaRPr>
-          </a:p>
-        </p:txBody>
-      </p:sp>
-      <p:sp>
-        <p:nvSpPr>
           <p:cNvPr id="167" name="Rectangle 166">
             <a:extLst>
               <a:ext uri="{FF2B5EF4-FFF2-40B4-BE49-F238E27FC236}">
@@ -5490,7 +5338,7 @@
         </p:nvSpPr>
         <p:spPr>
           <a:xfrm>
-            <a:off x="22735571" y="9927009"/>
+            <a:off x="22735571" y="9585443"/>
             <a:ext cx="596081" cy="339408"/>
           </a:xfrm>
           <a:prstGeom prst="rect">
@@ -5542,7 +5390,7 @@
         </p:nvSpPr>
         <p:spPr>
           <a:xfrm>
-            <a:off x="22459312" y="11136332"/>
+            <a:off x="22459312" y="10794766"/>
             <a:ext cx="276259" cy="433564"/>
           </a:xfrm>
           <a:prstGeom prst="rect">
@@ -5594,7 +5442,7 @@
         </p:nvSpPr>
         <p:spPr>
           <a:xfrm>
-            <a:off x="22956995" y="12839844"/>
+            <a:off x="22956995" y="12498278"/>
             <a:ext cx="276259" cy="433564"/>
           </a:xfrm>
           <a:prstGeom prst="rect">
@@ -7067,272 +6915,6 @@
           </a:fontRef>
         </p:style>
       </p:cxnSp>
-      <p:sp>
-        <p:nvSpPr>
-          <p:cNvPr id="102" name="TextBox 101">
-            <a:extLst>
-              <a:ext uri="{FF2B5EF4-FFF2-40B4-BE49-F238E27FC236}">
-                <a16:creationId xmlns:a16="http://schemas.microsoft.com/office/drawing/2014/main" id="{75DB8D17-492E-433D-AE97-44EAE1F03583}"/>
-              </a:ext>
-            </a:extLst>
-          </p:cNvPr>
-          <p:cNvSpPr txBox="1"/>
-          <p:nvPr/>
-        </p:nvSpPr>
-        <p:spPr>
-          <a:xfrm>
-            <a:off x="25804879" y="3609147"/>
-            <a:ext cx="407484" cy="461665"/>
-          </a:xfrm>
-          <a:prstGeom prst="rect">
-            <a:avLst/>
-          </a:prstGeom>
-          <a:noFill/>
-        </p:spPr>
-        <p:txBody>
-          <a:bodyPr wrap="square" rtlCol="0">
-            <a:spAutoFit/>
-          </a:bodyPr>
-          <a:lstStyle/>
-          <a:p>
-            <a:r>
-              <a:rPr lang="en-US" sz="2400" b="1" dirty="0">
-                <a:latin typeface="Avenir Roman" panose="02000503020000020003" pitchFamily="2" charset="0"/>
-              </a:rPr>
-              <a:t>D</a:t>
-            </a:r>
-          </a:p>
-        </p:txBody>
-      </p:sp>
-      <p:sp>
-        <p:nvSpPr>
-          <p:cNvPr id="103" name="TextBox 102">
-            <a:extLst>
-              <a:ext uri="{FF2B5EF4-FFF2-40B4-BE49-F238E27FC236}">
-                <a16:creationId xmlns:a16="http://schemas.microsoft.com/office/drawing/2014/main" id="{2753FEF7-F272-4366-909E-CB2B97A7D6AF}"/>
-              </a:ext>
-            </a:extLst>
-          </p:cNvPr>
-          <p:cNvSpPr txBox="1"/>
-          <p:nvPr/>
-        </p:nvSpPr>
-        <p:spPr>
-          <a:xfrm>
-            <a:off x="27800508" y="3521002"/>
-            <a:ext cx="407484" cy="461665"/>
-          </a:xfrm>
-          <a:prstGeom prst="rect">
-            <a:avLst/>
-          </a:prstGeom>
-          <a:noFill/>
-        </p:spPr>
-        <p:txBody>
-          <a:bodyPr wrap="square" rtlCol="0">
-            <a:spAutoFit/>
-          </a:bodyPr>
-          <a:lstStyle/>
-          <a:p>
-            <a:r>
-              <a:rPr lang="en-US" sz="2400" b="1" dirty="0">
-                <a:latin typeface="Avenir Roman" panose="02000503020000020003" pitchFamily="2" charset="0"/>
-              </a:rPr>
-              <a:t>E</a:t>
-            </a:r>
-          </a:p>
-        </p:txBody>
-      </p:sp>
-      <p:sp>
-        <p:nvSpPr>
-          <p:cNvPr id="104" name="TextBox 103">
-            <a:extLst>
-              <a:ext uri="{FF2B5EF4-FFF2-40B4-BE49-F238E27FC236}">
-                <a16:creationId xmlns:a16="http://schemas.microsoft.com/office/drawing/2014/main" id="{3CBAC7C7-F11E-4088-B2AA-301534877E21}"/>
-              </a:ext>
-            </a:extLst>
-          </p:cNvPr>
-          <p:cNvSpPr txBox="1"/>
-          <p:nvPr/>
-        </p:nvSpPr>
-        <p:spPr>
-          <a:xfrm>
-            <a:off x="18702969" y="3440224"/>
-            <a:ext cx="407484" cy="461665"/>
-          </a:xfrm>
-          <a:prstGeom prst="rect">
-            <a:avLst/>
-          </a:prstGeom>
-          <a:noFill/>
-        </p:spPr>
-        <p:txBody>
-          <a:bodyPr wrap="square" rtlCol="0">
-            <a:spAutoFit/>
-          </a:bodyPr>
-          <a:lstStyle/>
-          <a:p>
-            <a:r>
-              <a:rPr lang="en-US" sz="2400" b="1" dirty="0">
-                <a:latin typeface="Avenir Roman" panose="02000503020000020003" pitchFamily="2" charset="0"/>
-              </a:rPr>
-              <a:t>F</a:t>
-            </a:r>
-          </a:p>
-        </p:txBody>
-      </p:sp>
-      <p:sp>
-        <p:nvSpPr>
-          <p:cNvPr id="105" name="TextBox 104">
-            <a:extLst>
-              <a:ext uri="{FF2B5EF4-FFF2-40B4-BE49-F238E27FC236}">
-                <a16:creationId xmlns:a16="http://schemas.microsoft.com/office/drawing/2014/main" id="{5C5B4E8E-5F4A-4885-8E16-B19A29901EDB}"/>
-              </a:ext>
-            </a:extLst>
-          </p:cNvPr>
-          <p:cNvSpPr txBox="1"/>
-          <p:nvPr/>
-        </p:nvSpPr>
-        <p:spPr>
-          <a:xfrm>
-            <a:off x="23053639" y="3357360"/>
-            <a:ext cx="407484" cy="461665"/>
-          </a:xfrm>
-          <a:prstGeom prst="rect">
-            <a:avLst/>
-          </a:prstGeom>
-          <a:noFill/>
-        </p:spPr>
-        <p:txBody>
-          <a:bodyPr wrap="square" rtlCol="0">
-            <a:spAutoFit/>
-          </a:bodyPr>
-          <a:lstStyle/>
-          <a:p>
-            <a:r>
-              <a:rPr lang="en-US" sz="2400" b="1" dirty="0">
-                <a:latin typeface="Avenir Roman" panose="02000503020000020003" pitchFamily="2" charset="0"/>
-              </a:rPr>
-              <a:t>G</a:t>
-            </a:r>
-          </a:p>
-        </p:txBody>
-      </p:sp>
-      <p:sp>
-        <p:nvSpPr>
-          <p:cNvPr id="106" name="Rectangle 105">
-            <a:extLst>
-              <a:ext uri="{FF2B5EF4-FFF2-40B4-BE49-F238E27FC236}">
-                <a16:creationId xmlns:a16="http://schemas.microsoft.com/office/drawing/2014/main" id="{013E8892-CB1C-4F7B-8A61-FA04DB0F69E1}"/>
-              </a:ext>
-            </a:extLst>
-          </p:cNvPr>
-          <p:cNvSpPr/>
-          <p:nvPr/>
-        </p:nvSpPr>
-        <p:spPr>
-          <a:xfrm>
-            <a:off x="22843242" y="21546174"/>
-            <a:ext cx="18340658" cy="1631216"/>
-          </a:xfrm>
-          <a:prstGeom prst="rect">
-            <a:avLst/>
-          </a:prstGeom>
-        </p:spPr>
-        <p:txBody>
-          <a:bodyPr wrap="square">
-            <a:spAutoFit/>
-          </a:bodyPr>
-          <a:lstStyle/>
-          <a:p>
-            <a:r>
-              <a:rPr lang="nb-NO" sz="2000" b="1" dirty="0">
-                <a:latin typeface="+mj-lt"/>
-              </a:rPr>
-              <a:t>Fig.2A. </a:t>
-            </a:r>
-            <a:r>
-              <a:rPr lang="nb-NO" sz="2000" dirty="0">
-                <a:latin typeface="+mj-lt"/>
-              </a:rPr>
-              <a:t>Overall propensity to gamble increases as a function of when the gamble was introduced (p&lt;.01). </a:t>
-            </a:r>
-            <a:r>
-              <a:rPr lang="nb-NO" sz="2000" b="1" dirty="0">
-                <a:latin typeface="+mj-lt"/>
-              </a:rPr>
-              <a:t>B.</a:t>
-            </a:r>
-            <a:r>
-              <a:rPr lang="nb-NO" sz="2000" dirty="0">
-                <a:latin typeface="+mj-lt"/>
-              </a:rPr>
-              <a:t> Overall RT decreases as a function of when the gamble was introduced (p&lt;.001) Error bars represent standard error across participants </a:t>
-            </a:r>
-            <a:r>
-              <a:rPr lang="nb-NO" sz="2000" b="1" dirty="0">
-                <a:latin typeface="+mj-lt"/>
-              </a:rPr>
-              <a:t>C. </a:t>
-            </a:r>
-            <a:r>
-              <a:rPr lang="nb-NO" sz="2000" dirty="0">
-                <a:latin typeface="+mj-lt"/>
-              </a:rPr>
-              <a:t>Each participant’s gamble slope is plotted against their RT slope.  </a:t>
-            </a:r>
-            <a:r>
-              <a:rPr lang="nb-NO" sz="2000" b="1" dirty="0">
-                <a:latin typeface="+mj-lt"/>
-              </a:rPr>
-              <a:t>D. </a:t>
-            </a:r>
-            <a:r>
-              <a:rPr lang="nb-NO" sz="2000" dirty="0">
-                <a:latin typeface="+mj-lt"/>
-              </a:rPr>
-              <a:t>Histogram of all individual gamble slopes. Mean of distribution is sig. more than 0 (p&lt;.01) </a:t>
-            </a:r>
-            <a:r>
-              <a:rPr lang="nb-NO" sz="2000" b="1" dirty="0">
-                <a:latin typeface="+mj-lt"/>
-              </a:rPr>
-              <a:t>E. </a:t>
-            </a:r>
-            <a:r>
-              <a:rPr lang="nb-NO" sz="2000" dirty="0">
-                <a:latin typeface="+mj-lt"/>
-              </a:rPr>
-              <a:t>Histogram of all individual RT slopes. Mean of distribution is sig. less than than 0 (p&lt;.001). </a:t>
-            </a:r>
-            <a:r>
-              <a:rPr lang="nb-NO" sz="2000" b="1" dirty="0">
-                <a:latin typeface="+mj-lt"/>
-              </a:rPr>
-              <a:t>F. </a:t>
-            </a:r>
-            <a:r>
-              <a:rPr lang="nb-NO" sz="2000" dirty="0">
-                <a:latin typeface="+mj-lt"/>
-              </a:rPr>
-              <a:t>Magnitude has no effect on participants’ decision to gamble (n.s.). Error bars represent within-subject standard error. </a:t>
-            </a:r>
-            <a:r>
-              <a:rPr lang="nb-NO" sz="2000" b="1" dirty="0">
-                <a:latin typeface="+mj-lt"/>
-              </a:rPr>
-              <a:t>G. </a:t>
-            </a:r>
-            <a:r>
-              <a:rPr lang="nb-NO" sz="2000" dirty="0">
-                <a:latin typeface="+mj-lt"/>
-              </a:rPr>
-              <a:t>A trial’s value significantly increases a participant’s propensity to gamble (p&lt;.001). Error bars represent within-subject standard error. </a:t>
-            </a:r>
-            <a:endParaRPr lang="nb-NO" sz="2000" b="1" dirty="0">
-              <a:effectLst/>
-              <a:latin typeface="+mj-lt"/>
-            </a:endParaRPr>
-          </a:p>
-        </p:txBody>
-      </p:sp>
       <p:pic>
         <p:nvPicPr>
           <p:cNvPr id="12" name="Picture 11">
@@ -7610,7 +7192,7 @@
         </p:nvSpPr>
         <p:spPr>
           <a:xfrm>
-            <a:off x="22099252" y="14577606"/>
+            <a:off x="23309703" y="15349140"/>
             <a:ext cx="8585667" cy="553998"/>
           </a:xfrm>
           <a:prstGeom prst="rect">
@@ -7657,7 +7239,7 @@
         </p:nvSpPr>
         <p:spPr>
           <a:xfrm>
-            <a:off x="21851393" y="9753468"/>
+            <a:off x="22607510" y="9677252"/>
             <a:ext cx="9081386" cy="553998"/>
           </a:xfrm>
           <a:prstGeom prst="rect">
@@ -7704,7 +7286,7 @@
         </p:nvSpPr>
         <p:spPr>
           <a:xfrm>
-            <a:off x="21774544" y="4666183"/>
+            <a:off x="22649274" y="4678658"/>
             <a:ext cx="8585667" cy="553998"/>
           </a:xfrm>
           <a:prstGeom prst="rect">
@@ -7759,8 +7341,8 @@
         </p:blipFill>
         <p:spPr>
           <a:xfrm>
-            <a:off x="32013571" y="5881877"/>
-            <a:ext cx="5155912" cy="3389154"/>
+            <a:off x="33684812" y="5627760"/>
+            <a:ext cx="4566441" cy="3001675"/>
           </a:xfrm>
           <a:prstGeom prst="rect">
             <a:avLst/>
@@ -7789,8 +7371,8 @@
         </p:blipFill>
         <p:spPr>
           <a:xfrm>
-            <a:off x="21210207" y="6017120"/>
-            <a:ext cx="4702128" cy="3090865"/>
+            <a:off x="21849089" y="5410640"/>
+            <a:ext cx="5814874" cy="3822310"/>
           </a:xfrm>
           <a:prstGeom prst="rect">
             <a:avLst/>
@@ -7819,8 +7401,8 @@
         </p:blipFill>
         <p:spPr>
           <a:xfrm>
-            <a:off x="26419717" y="6078972"/>
-            <a:ext cx="4702129" cy="3090866"/>
+            <a:off x="27821322" y="5399122"/>
+            <a:ext cx="5812545" cy="3820780"/>
           </a:xfrm>
           <a:prstGeom prst="rect">
             <a:avLst/>
@@ -7849,8 +7431,8 @@
         </p:blipFill>
         <p:spPr>
           <a:xfrm>
-            <a:off x="21567905" y="10527255"/>
-            <a:ext cx="4663332" cy="3065364"/>
+            <a:off x="22227683" y="10397425"/>
+            <a:ext cx="5946485" cy="3908823"/>
           </a:xfrm>
           <a:prstGeom prst="rect">
             <a:avLst/>
@@ -7879,8 +7461,8 @@
         </p:blipFill>
         <p:spPr>
           <a:xfrm>
-            <a:off x="26419717" y="10473478"/>
-            <a:ext cx="4861027" cy="3195316"/>
+            <a:off x="28254483" y="10314570"/>
+            <a:ext cx="6198577" cy="4074532"/>
           </a:xfrm>
           <a:prstGeom prst="rect">
             <a:avLst/>
@@ -7909,8 +7491,8 @@
         </p:blipFill>
         <p:spPr>
           <a:xfrm>
-            <a:off x="21931080" y="15737598"/>
-            <a:ext cx="4315093" cy="2836454"/>
+            <a:off x="22455623" y="16289691"/>
+            <a:ext cx="6040755" cy="3970789"/>
           </a:xfrm>
           <a:prstGeom prst="rect">
             <a:avLst/>
@@ -7939,14 +7521,348 @@
         </p:blipFill>
         <p:spPr>
           <a:xfrm>
-            <a:off x="26419717" y="15562490"/>
-            <a:ext cx="4584551" cy="3013578"/>
+            <a:off x="28280757" y="16301848"/>
+            <a:ext cx="5908369" cy="3883768"/>
           </a:xfrm>
           <a:prstGeom prst="rect">
             <a:avLst/>
           </a:prstGeom>
         </p:spPr>
       </p:pic>
+      <p:pic>
+        <p:nvPicPr>
+          <p:cNvPr id="10" name="Picture 9">
+            <a:extLst>
+              <a:ext uri="{FF2B5EF4-FFF2-40B4-BE49-F238E27FC236}">
+                <a16:creationId xmlns:a16="http://schemas.microsoft.com/office/drawing/2014/main" id="{2094A08A-0EE4-4C88-966C-046A93411DB3}"/>
+              </a:ext>
+            </a:extLst>
+          </p:cNvPr>
+          <p:cNvPicPr>
+            <a:picLocks noChangeAspect="1"/>
+          </p:cNvPicPr>
+          <p:nvPr/>
+        </p:nvPicPr>
+        <p:blipFill>
+          <a:blip r:embed="rId25"/>
+          <a:stretch>
+            <a:fillRect/>
+          </a:stretch>
+        </p:blipFill>
+        <p:spPr>
+          <a:xfrm>
+            <a:off x="34834876" y="12381123"/>
+            <a:ext cx="2977050" cy="2180419"/>
+          </a:xfrm>
+          <a:prstGeom prst="rect">
+            <a:avLst/>
+          </a:prstGeom>
+        </p:spPr>
+      </p:pic>
+      <p:pic>
+        <p:nvPicPr>
+          <p:cNvPr id="18" name="Picture 17">
+            <a:extLst>
+              <a:ext uri="{FF2B5EF4-FFF2-40B4-BE49-F238E27FC236}">
+                <a16:creationId xmlns:a16="http://schemas.microsoft.com/office/drawing/2014/main" id="{4AC8E408-1702-4D58-955B-29FF2DE453A5}"/>
+              </a:ext>
+            </a:extLst>
+          </p:cNvPr>
+          <p:cNvPicPr>
+            <a:picLocks noChangeAspect="1"/>
+          </p:cNvPicPr>
+          <p:nvPr/>
+        </p:nvPicPr>
+        <p:blipFill>
+          <a:blip r:embed="rId26"/>
+          <a:stretch>
+            <a:fillRect/>
+          </a:stretch>
+        </p:blipFill>
+        <p:spPr>
+          <a:xfrm>
+            <a:off x="38447024" y="12381123"/>
+            <a:ext cx="2977050" cy="2180419"/>
+          </a:xfrm>
+          <a:prstGeom prst="rect">
+            <a:avLst/>
+          </a:prstGeom>
+        </p:spPr>
+      </p:pic>
+      <p:pic>
+        <p:nvPicPr>
+          <p:cNvPr id="19" name="Picture 18">
+            <a:extLst>
+              <a:ext uri="{FF2B5EF4-FFF2-40B4-BE49-F238E27FC236}">
+                <a16:creationId xmlns:a16="http://schemas.microsoft.com/office/drawing/2014/main" id="{9D5B5D7F-F711-488D-9D35-3C4D3DECAEE3}"/>
+              </a:ext>
+            </a:extLst>
+          </p:cNvPr>
+          <p:cNvPicPr>
+            <a:picLocks noChangeAspect="1"/>
+          </p:cNvPicPr>
+          <p:nvPr/>
+        </p:nvPicPr>
+        <p:blipFill>
+          <a:blip r:embed="rId27"/>
+          <a:stretch>
+            <a:fillRect/>
+          </a:stretch>
+        </p:blipFill>
+        <p:spPr>
+          <a:xfrm>
+            <a:off x="34744651" y="17964923"/>
+            <a:ext cx="2977051" cy="2180420"/>
+          </a:xfrm>
+          <a:prstGeom prst="rect">
+            <a:avLst/>
+          </a:prstGeom>
+        </p:spPr>
+      </p:pic>
+      <p:pic>
+        <p:nvPicPr>
+          <p:cNvPr id="21" name="Picture 20">
+            <a:extLst>
+              <a:ext uri="{FF2B5EF4-FFF2-40B4-BE49-F238E27FC236}">
+                <a16:creationId xmlns:a16="http://schemas.microsoft.com/office/drawing/2014/main" id="{6BA230C1-1DA9-42FC-9579-2AEA8505F46B}"/>
+              </a:ext>
+            </a:extLst>
+          </p:cNvPr>
+          <p:cNvPicPr>
+            <a:picLocks noChangeAspect="1"/>
+          </p:cNvPicPr>
+          <p:nvPr/>
+        </p:nvPicPr>
+        <p:blipFill>
+          <a:blip r:embed="rId28"/>
+          <a:stretch>
+            <a:fillRect/>
+          </a:stretch>
+        </p:blipFill>
+        <p:spPr>
+          <a:xfrm>
+            <a:off x="38447024" y="18048754"/>
+            <a:ext cx="2862592" cy="2096589"/>
+          </a:xfrm>
+          <a:prstGeom prst="rect">
+            <a:avLst/>
+          </a:prstGeom>
+        </p:spPr>
+      </p:pic>
+      <p:pic>
+        <p:nvPicPr>
+          <p:cNvPr id="22" name="Picture 21">
+            <a:extLst>
+              <a:ext uri="{FF2B5EF4-FFF2-40B4-BE49-F238E27FC236}">
+                <a16:creationId xmlns:a16="http://schemas.microsoft.com/office/drawing/2014/main" id="{8F207C7A-B647-4272-9B33-0B88CAB5E332}"/>
+              </a:ext>
+            </a:extLst>
+          </p:cNvPr>
+          <p:cNvPicPr>
+            <a:picLocks noChangeAspect="1"/>
+          </p:cNvPicPr>
+          <p:nvPr/>
+        </p:nvPicPr>
+        <p:blipFill>
+          <a:blip r:embed="rId29"/>
+          <a:stretch>
+            <a:fillRect/>
+          </a:stretch>
+        </p:blipFill>
+        <p:spPr>
+          <a:xfrm>
+            <a:off x="34801743" y="15446099"/>
+            <a:ext cx="2862865" cy="2096789"/>
+          </a:xfrm>
+          <a:prstGeom prst="rect">
+            <a:avLst/>
+          </a:prstGeom>
+        </p:spPr>
+      </p:pic>
+      <p:pic>
+        <p:nvPicPr>
+          <p:cNvPr id="24" name="Picture 23">
+            <a:extLst>
+              <a:ext uri="{FF2B5EF4-FFF2-40B4-BE49-F238E27FC236}">
+                <a16:creationId xmlns:a16="http://schemas.microsoft.com/office/drawing/2014/main" id="{E6FB8651-7D66-45C6-93F7-7BD7DF40F152}"/>
+              </a:ext>
+            </a:extLst>
+          </p:cNvPr>
+          <p:cNvPicPr>
+            <a:picLocks noChangeAspect="1"/>
+          </p:cNvPicPr>
+          <p:nvPr/>
+        </p:nvPicPr>
+        <p:blipFill>
+          <a:blip r:embed="rId30"/>
+          <a:stretch>
+            <a:fillRect/>
+          </a:stretch>
+        </p:blipFill>
+        <p:spPr>
+          <a:xfrm>
+            <a:off x="38486908" y="15540337"/>
+            <a:ext cx="2584382" cy="1892826"/>
+          </a:xfrm>
+          <a:prstGeom prst="rect">
+            <a:avLst/>
+          </a:prstGeom>
+        </p:spPr>
+      </p:pic>
+      <p:pic>
+        <p:nvPicPr>
+          <p:cNvPr id="25" name="Picture 24">
+            <a:extLst>
+              <a:ext uri="{FF2B5EF4-FFF2-40B4-BE49-F238E27FC236}">
+                <a16:creationId xmlns:a16="http://schemas.microsoft.com/office/drawing/2014/main" id="{4A72CFC6-E939-4E4B-A6D8-0E7910971772}"/>
+              </a:ext>
+            </a:extLst>
+          </p:cNvPr>
+          <p:cNvPicPr>
+            <a:picLocks noChangeAspect="1"/>
+          </p:cNvPicPr>
+          <p:nvPr/>
+        </p:nvPicPr>
+        <p:blipFill>
+          <a:blip r:embed="rId31"/>
+          <a:stretch>
+            <a:fillRect/>
+          </a:stretch>
+        </p:blipFill>
+        <p:spPr>
+          <a:xfrm>
+            <a:off x="34834876" y="10099475"/>
+            <a:ext cx="2616402" cy="1916277"/>
+          </a:xfrm>
+          <a:prstGeom prst="rect">
+            <a:avLst/>
+          </a:prstGeom>
+        </p:spPr>
+      </p:pic>
+      <p:pic>
+        <p:nvPicPr>
+          <p:cNvPr id="26" name="Picture 25">
+            <a:extLst>
+              <a:ext uri="{FF2B5EF4-FFF2-40B4-BE49-F238E27FC236}">
+                <a16:creationId xmlns:a16="http://schemas.microsoft.com/office/drawing/2014/main" id="{F6D80A29-0109-47C5-B54F-A9CF365BE7AB}"/>
+              </a:ext>
+            </a:extLst>
+          </p:cNvPr>
+          <p:cNvPicPr>
+            <a:picLocks noChangeAspect="1"/>
+          </p:cNvPicPr>
+          <p:nvPr/>
+        </p:nvPicPr>
+        <p:blipFill>
+          <a:blip r:embed="rId32"/>
+          <a:stretch>
+            <a:fillRect/>
+          </a:stretch>
+        </p:blipFill>
+        <p:spPr>
+          <a:xfrm>
+            <a:off x="38447024" y="10227503"/>
+            <a:ext cx="2651889" cy="1942268"/>
+          </a:xfrm>
+          <a:prstGeom prst="rect">
+            <a:avLst/>
+          </a:prstGeom>
+        </p:spPr>
+      </p:pic>
+      <p:sp>
+        <p:nvSpPr>
+          <p:cNvPr id="159" name="Textfeld 47">
+            <a:extLst>
+              <a:ext uri="{FF2B5EF4-FFF2-40B4-BE49-F238E27FC236}">
+                <a16:creationId xmlns:a16="http://schemas.microsoft.com/office/drawing/2014/main" id="{FB237A7F-6258-434A-8A64-7A6647A79ED4}"/>
+              </a:ext>
+            </a:extLst>
+          </p:cNvPr>
+          <p:cNvSpPr txBox="1"/>
+          <p:nvPr/>
+        </p:nvSpPr>
+        <p:spPr>
+          <a:xfrm>
+            <a:off x="22189147" y="21564476"/>
+            <a:ext cx="19253053" cy="4862870"/>
+          </a:xfrm>
+          <a:prstGeom prst="rect">
+            <a:avLst/>
+          </a:prstGeom>
+          <a:noFill/>
+        </p:spPr>
+        <p:txBody>
+          <a:bodyPr wrap="square" rtlCol="0">
+            <a:spAutoFit/>
+          </a:bodyPr>
+          <a:lstStyle/>
+          <a:p>
+            <a:pPr marL="457200" indent="-457200">
+              <a:buFont typeface="Arial" panose="020B0604020202020204" pitchFamily="34" charset="0"/>
+              <a:buChar char="•"/>
+            </a:pPr>
+            <a:r>
+              <a:rPr lang="en-US" sz="2600" noProof="1">
+                <a:latin typeface="+mj-lt"/>
+              </a:rPr>
+              <a:t>The later the gamble interrupted the progress bar (i.e. the closer the participant was to the reward), the more likely a participant gambled and the lower their RT tended to be. </a:t>
+            </a:r>
+          </a:p>
+          <a:p>
+            <a:pPr marL="457200" indent="-457200">
+              <a:buFont typeface="Arial" panose="020B0604020202020204" pitchFamily="34" charset="0"/>
+              <a:buChar char="•"/>
+            </a:pPr>
+            <a:r>
+              <a:rPr lang="en-US" sz="2600" noProof="1">
+                <a:latin typeface="+mj-lt"/>
+              </a:rPr>
+              <a:t>These effects were specifically robust to participants who failed at least one catch trial. In fact, participants who passed all catch trials tended to exhibit a negative relationship between gambling propensity and interruption time. These data are indicative of a possible link between impulsivity and dopaminergic release (Buckholtz et al., 2010).</a:t>
+            </a:r>
+          </a:p>
+          <a:p>
+            <a:pPr marL="457200" indent="-457200">
+              <a:buFont typeface="Arial" panose="020B0604020202020204" pitchFamily="34" charset="0"/>
+              <a:buChar char="•"/>
+            </a:pPr>
+            <a:r>
+              <a:rPr lang="en-US" sz="2600" noProof="1">
+                <a:latin typeface="+mj-lt"/>
+              </a:rPr>
+              <a:t>Magnitude had no effect on driving the propensity  to gamble but a higher value gamble increased a participant’s propensity to gamble. This effect was strongest in individuals who passed all catch trials. </a:t>
+            </a:r>
+          </a:p>
+          <a:p>
+            <a:pPr marL="457200" indent="-457200">
+              <a:buFont typeface="Arial" panose="020B0604020202020204" pitchFamily="34" charset="0"/>
+              <a:buChar char="•"/>
+            </a:pPr>
+            <a:r>
+              <a:rPr lang="en-US" sz="2600" noProof="1">
+                <a:latin typeface="+mj-lt"/>
+              </a:rPr>
+              <a:t>Future versions will investigate the effect of the progress bar pausing, an instrumental choice being made at the time of the gamble, and removing the gamble preview.</a:t>
+            </a:r>
+          </a:p>
+          <a:p>
+            <a:pPr marL="457200" indent="-457200">
+              <a:buFont typeface="Arial" panose="020B0604020202020204" pitchFamily="34" charset="0"/>
+              <a:buChar char="•"/>
+            </a:pPr>
+            <a:r>
+              <a:rPr lang="en-US" sz="2600" noProof="1">
+                <a:latin typeface="+mj-lt"/>
+              </a:rPr>
+              <a:t>These pilot data are consistent with the theory that DA dynamics affect how humans calculate the value of an acion and that the value of such a calculation may shift as a promixity to a reward.</a:t>
+            </a:r>
+          </a:p>
+          <a:p>
+            <a:endParaRPr lang="en-US" sz="2400" noProof="1">
+              <a:latin typeface="+mj-lt"/>
+            </a:endParaRPr>
+          </a:p>
+        </p:txBody>
+      </p:sp>
     </p:spTree>
   </p:cSld>
   <p:clrMapOvr>

</xml_diff>